<commit_message>
update slides of akka after meeting
</commit_message>
<xml_diff>
--- a/design/Akka.pptx
+++ b/design/Akka.pptx
@@ -10990,7 +10990,7 @@
         </p:nvSpPr>
         <p:spPr>
           <a:xfrm>
-            <a:off x="5727035" y="902366"/>
+            <a:off x="8182136" y="877314"/>
             <a:ext cx="1588168" cy="1042737"/>
           </a:xfrm>
           <a:prstGeom prst="ellipse">
@@ -11039,7 +11039,7 @@
         </p:nvSpPr>
         <p:spPr>
           <a:xfrm>
-            <a:off x="2991855" y="5594686"/>
+            <a:off x="5446956" y="5569634"/>
             <a:ext cx="1588168" cy="1042737"/>
           </a:xfrm>
           <a:prstGeom prst="ellipse">
@@ -11088,7 +11088,7 @@
         </p:nvSpPr>
         <p:spPr>
           <a:xfrm>
-            <a:off x="3224437" y="3932823"/>
+            <a:off x="5679538" y="3907771"/>
             <a:ext cx="1588168" cy="1042737"/>
           </a:xfrm>
           <a:prstGeom prst="ellipse">
@@ -11137,7 +11137,7 @@
         </p:nvSpPr>
         <p:spPr>
           <a:xfrm>
-            <a:off x="5727035" y="2257422"/>
+            <a:off x="8182136" y="2232370"/>
             <a:ext cx="1588168" cy="1042737"/>
           </a:xfrm>
           <a:prstGeom prst="ellipse">
@@ -11186,7 +11186,7 @@
         </p:nvSpPr>
         <p:spPr>
           <a:xfrm>
-            <a:off x="112295" y="3262562"/>
+            <a:off x="2567396" y="3237510"/>
             <a:ext cx="2646947" cy="1042737"/>
           </a:xfrm>
           <a:prstGeom prst="ellipse">
@@ -11235,7 +11235,7 @@
         </p:nvSpPr>
         <p:spPr>
           <a:xfrm>
-            <a:off x="2991855" y="2010274"/>
+            <a:off x="5446956" y="1985222"/>
             <a:ext cx="1588168" cy="1042737"/>
           </a:xfrm>
           <a:prstGeom prst="ellipse">
@@ -11288,7 +11288,7 @@
         </p:nvCxnSpPr>
         <p:spPr>
           <a:xfrm flipV="1">
-            <a:off x="4347441" y="1423735"/>
+            <a:off x="6802542" y="1398683"/>
             <a:ext cx="1379594" cy="739244"/>
           </a:xfrm>
           <a:prstGeom prst="straightConnector1">
@@ -11327,7 +11327,7 @@
         </p:nvSpPr>
         <p:spPr>
           <a:xfrm>
-            <a:off x="5727035" y="3718261"/>
+            <a:off x="8182136" y="3693209"/>
             <a:ext cx="1588168" cy="1042737"/>
           </a:xfrm>
           <a:prstGeom prst="ellipse">
@@ -11380,7 +11380,7 @@
         </p:nvCxnSpPr>
         <p:spPr>
           <a:xfrm flipV="1">
-            <a:off x="2371606" y="2900306"/>
+            <a:off x="4826707" y="2875254"/>
             <a:ext cx="852831" cy="514961"/>
           </a:xfrm>
           <a:prstGeom prst="straightConnector1">
@@ -11423,7 +11423,7 @@
         </p:nvCxnSpPr>
         <p:spPr>
           <a:xfrm>
-            <a:off x="2759242" y="3783931"/>
+            <a:off x="5214343" y="3758879"/>
             <a:ext cx="697777" cy="301597"/>
           </a:xfrm>
           <a:prstGeom prst="straightConnector1">
@@ -11466,7 +11466,7 @@
         </p:nvCxnSpPr>
         <p:spPr>
           <a:xfrm>
-            <a:off x="2371606" y="4152594"/>
+            <a:off x="4826707" y="4127542"/>
             <a:ext cx="852831" cy="1594797"/>
           </a:xfrm>
           <a:prstGeom prst="straightConnector1">
@@ -11509,7 +11509,7 @@
         </p:nvCxnSpPr>
         <p:spPr>
           <a:xfrm>
-            <a:off x="4580023" y="2531643"/>
+            <a:off x="7035124" y="2506591"/>
             <a:ext cx="1147012" cy="247148"/>
           </a:xfrm>
           <a:prstGeom prst="straightConnector1">
@@ -11552,7 +11552,7 @@
         </p:nvCxnSpPr>
         <p:spPr>
           <a:xfrm flipV="1">
-            <a:off x="4812605" y="4239630"/>
+            <a:off x="7267706" y="4214578"/>
             <a:ext cx="914430" cy="214562"/>
           </a:xfrm>
           <a:prstGeom prst="straightConnector1">
@@ -11591,8 +11591,8 @@
         </p:nvSpPr>
         <p:spPr>
           <a:xfrm>
-            <a:off x="349486" y="382903"/>
-            <a:ext cx="2279150" cy="369332"/>
+            <a:off x="2804587" y="357851"/>
+            <a:ext cx="777970" cy="369332"/>
           </a:xfrm>
           <a:prstGeom prst="rect">
             <a:avLst/>
@@ -11607,17 +11607,17 @@
           <a:p>
             <a:r>
               <a:rPr lang="de-DE"/>
-              <a:t>Actors in jimplification</a:t>
-            </a:r>
-          </a:p>
-        </p:txBody>
-      </p:sp>
-      <p:sp>
-        <p:nvSpPr>
-          <p:cNvPr id="59" name="Denkblase: wolkenförmig 58">
-            <a:extLst>
-              <a:ext uri="{FF2B5EF4-FFF2-40B4-BE49-F238E27FC236}">
-                <a16:creationId xmlns:a16="http://schemas.microsoft.com/office/drawing/2014/main" id="{0C1B056E-53FD-4964-87BB-D930FCC851FF}"/>
+              <a:t>Actors</a:t>
+            </a:r>
+          </a:p>
+        </p:txBody>
+      </p:sp>
+      <p:sp>
+        <p:nvSpPr>
+          <p:cNvPr id="70" name="Ellipse 69">
+            <a:extLst>
+              <a:ext uri="{FF2B5EF4-FFF2-40B4-BE49-F238E27FC236}">
+                <a16:creationId xmlns:a16="http://schemas.microsoft.com/office/drawing/2014/main" id="{734DDE87-7F8A-42BB-8AAD-6CA2CBEF36F2}"/>
               </a:ext>
             </a:extLst>
           </p:cNvPr>
@@ -11626,54 +11626,7 @@
         </p:nvSpPr>
         <p:spPr>
           <a:xfrm>
-            <a:off x="8179133" y="2186437"/>
-            <a:ext cx="1710858" cy="912769"/>
-          </a:xfrm>
-          <a:prstGeom prst="cloudCallout">
-            <a:avLst/>
-          </a:prstGeom>
-        </p:spPr>
-        <p:style>
-          <a:lnRef idx="1">
-            <a:schemeClr val="accent2"/>
-          </a:lnRef>
-          <a:fillRef idx="2">
-            <a:schemeClr val="accent2"/>
-          </a:fillRef>
-          <a:effectRef idx="1">
-            <a:schemeClr val="accent2"/>
-          </a:effectRef>
-          <a:fontRef idx="minor">
-            <a:schemeClr val="dk1"/>
-          </a:fontRef>
-        </p:style>
-        <p:txBody>
-          <a:bodyPr rtlCol="0" anchor="ctr"/>
-          <a:lstStyle/>
-          <a:p>
-            <a:pPr algn="ctr"/>
-            <a:r>
-              <a:rPr lang="de-DE"/>
-              <a:t>Type inference</a:t>
-            </a:r>
-          </a:p>
-        </p:txBody>
-      </p:sp>
-      <p:sp>
-        <p:nvSpPr>
-          <p:cNvPr id="70" name="Ellipse 69">
-            <a:extLst>
-              <a:ext uri="{FF2B5EF4-FFF2-40B4-BE49-F238E27FC236}">
-                <a16:creationId xmlns:a16="http://schemas.microsoft.com/office/drawing/2014/main" id="{734DDE87-7F8A-42BB-8AAD-6CA2CBEF36F2}"/>
-              </a:ext>
-            </a:extLst>
-          </p:cNvPr>
-          <p:cNvSpPr/>
-          <p:nvPr/>
-        </p:nvSpPr>
-        <p:spPr>
-          <a:xfrm>
-            <a:off x="5799225" y="5073317"/>
+            <a:off x="8254326" y="5048265"/>
             <a:ext cx="1588168" cy="1042737"/>
           </a:xfrm>
           <a:prstGeom prst="ellipse">
@@ -11726,7 +11679,7 @@
         </p:nvCxnSpPr>
         <p:spPr>
           <a:xfrm>
-            <a:off x="4580023" y="4822855"/>
+            <a:off x="7035124" y="4797803"/>
             <a:ext cx="1219202" cy="771831"/>
           </a:xfrm>
           <a:prstGeom prst="straightConnector1">
@@ -11751,102 +11704,104 @@
           </a:fontRef>
         </p:style>
       </p:cxnSp>
+      <p:sp>
+        <p:nvSpPr>
+          <p:cNvPr id="26" name="Ellipse 25">
+            <a:extLst>
+              <a:ext uri="{FF2B5EF4-FFF2-40B4-BE49-F238E27FC236}">
+                <a16:creationId xmlns:a16="http://schemas.microsoft.com/office/drawing/2014/main" id="{7CC7185C-FE1A-4F32-82CB-94F374D1F0F1}"/>
+              </a:ext>
+            </a:extLst>
+          </p:cNvPr>
+          <p:cNvSpPr/>
+          <p:nvPr/>
+        </p:nvSpPr>
+        <p:spPr>
+          <a:xfrm>
+            <a:off x="2567039" y="4950508"/>
+            <a:ext cx="2646947" cy="1042737"/>
+          </a:xfrm>
+          <a:prstGeom prst="ellipse">
+            <a:avLst/>
+          </a:prstGeom>
+        </p:spPr>
+        <p:style>
+          <a:lnRef idx="2">
+            <a:schemeClr val="accent1">
+              <a:shade val="50000"/>
+            </a:schemeClr>
+          </a:lnRef>
+          <a:fillRef idx="1">
+            <a:schemeClr val="accent1"/>
+          </a:fillRef>
+          <a:effectRef idx="0">
+            <a:schemeClr val="accent1"/>
+          </a:effectRef>
+          <a:fontRef idx="minor">
+            <a:schemeClr val="lt1"/>
+          </a:fontRef>
+        </p:style>
+        <p:txBody>
+          <a:bodyPr rtlCol="0" anchor="ctr"/>
+          <a:lstStyle/>
+          <a:p>
+            <a:pPr algn="ctr"/>
+            <a:r>
+              <a:rPr lang="de-DE"/>
+              <a:t>CallgraphBuilder </a:t>
+            </a:r>
+          </a:p>
+        </p:txBody>
+      </p:sp>
       <p:cxnSp>
         <p:nvCxnSpPr>
-          <p:cNvPr id="81" name="Verbinder: gekrümmt 80">
-            <a:extLst>
-              <a:ext uri="{FF2B5EF4-FFF2-40B4-BE49-F238E27FC236}">
-                <a16:creationId xmlns:a16="http://schemas.microsoft.com/office/drawing/2014/main" id="{00E9BEDF-5A0A-4F9C-9894-DBA416D7B770}"/>
+          <p:cNvPr id="27" name="Gerade Verbindung mit Pfeil 26">
+            <a:extLst>
+              <a:ext uri="{FF2B5EF4-FFF2-40B4-BE49-F238E27FC236}">
+                <a16:creationId xmlns:a16="http://schemas.microsoft.com/office/drawing/2014/main" id="{868447BF-6811-42D3-8432-EB1AF565873F}"/>
               </a:ext>
             </a:extLst>
           </p:cNvPr>
           <p:cNvCxnSpPr>
             <a:cxnSpLocks/>
-            <a:stCxn id="4" idx="6"/>
-            <a:endCxn id="85" idx="0"/>
+            <a:stCxn id="26" idx="0"/>
+            <a:endCxn id="9" idx="4"/>
           </p:cNvCxnSpPr>
           <p:nvPr/>
         </p:nvCxnSpPr>
         <p:spPr>
-          <a:xfrm>
-            <a:off x="7315203" y="1423735"/>
-            <a:ext cx="888629" cy="3918398"/>
-          </a:xfrm>
-          <a:prstGeom prst="curvedConnector2">
-            <a:avLst/>
-          </a:prstGeom>
-          <a:ln>
+          <a:xfrm flipV="1">
+            <a:off x="3890513" y="4280247"/>
+            <a:ext cx="357" cy="670261"/>
+          </a:xfrm>
+          <a:prstGeom prst="straightConnector1">
+            <a:avLst/>
+          </a:prstGeom>
+          <a:ln w="38100">
             <a:tailEnd type="triangle"/>
           </a:ln>
         </p:spPr>
         <p:style>
-          <a:lnRef idx="3">
-            <a:schemeClr val="accent2"/>
+          <a:lnRef idx="1">
+            <a:schemeClr val="accent1"/>
           </a:lnRef>
           <a:fillRef idx="0">
-            <a:schemeClr val="accent2"/>
-          </a:fillRef>
-          <a:effectRef idx="2">
-            <a:schemeClr val="accent2"/>
+            <a:schemeClr val="accent1"/>
+          </a:fillRef>
+          <a:effectRef idx="0">
+            <a:schemeClr val="accent1"/>
           </a:effectRef>
           <a:fontRef idx="minor">
             <a:schemeClr val="tx1"/>
           </a:fontRef>
         </p:style>
       </p:cxnSp>
-      <p:pic>
-        <p:nvPicPr>
-          <p:cNvPr id="83" name="Picture 8" descr="Image result for mail clipart">
-            <a:extLst>
-              <a:ext uri="{FF2B5EF4-FFF2-40B4-BE49-F238E27FC236}">
-                <a16:creationId xmlns:a16="http://schemas.microsoft.com/office/drawing/2014/main" id="{5268C368-4674-4604-B255-5BA33966CEA9}"/>
-              </a:ext>
-            </a:extLst>
-          </p:cNvPr>
-          <p:cNvPicPr>
-            <a:picLocks noChangeAspect="1" noChangeArrowheads="1"/>
-          </p:cNvPicPr>
-          <p:nvPr/>
-        </p:nvPicPr>
-        <p:blipFill>
-          <a:blip r:embed="rId2">
-            <a:extLst>
-              <a:ext uri="{28A0092B-C50C-407E-A947-70E740481C1C}">
-                <a14:useLocalDpi xmlns:a14="http://schemas.microsoft.com/office/drawing/2010/main" val="0"/>
-              </a:ext>
-            </a:extLst>
-          </a:blip>
-          <a:srcRect/>
-          <a:stretch>
-            <a:fillRect/>
-          </a:stretch>
-        </p:blipFill>
-        <p:spPr bwMode="auto">
-          <a:xfrm flipH="1">
-            <a:off x="7880238" y="3262562"/>
-            <a:ext cx="520912" cy="359249"/>
-          </a:xfrm>
-          <a:prstGeom prst="rect">
-            <a:avLst/>
-          </a:prstGeom>
-          <a:noFill/>
-          <a:extLst>
-            <a:ext uri="{909E8E84-426E-40DD-AFC4-6F175D3DCCD1}">
-              <a14:hiddenFill xmlns:a14="http://schemas.microsoft.com/office/drawing/2010/main">
-                <a:solidFill>
-                  <a:srgbClr val="FFFFFF"/>
-                </a:solidFill>
-              </a14:hiddenFill>
-            </a:ext>
-          </a:extLst>
-        </p:spPr>
-      </p:pic>
-      <p:sp>
-        <p:nvSpPr>
-          <p:cNvPr id="84" name="Cube 83">
-            <a:extLst>
-              <a:ext uri="{FF2B5EF4-FFF2-40B4-BE49-F238E27FC236}">
-                <a16:creationId xmlns:a16="http://schemas.microsoft.com/office/drawing/2014/main" id="{8A6E7243-48CB-4012-8E7C-4C6EA10EEF47}"/>
+      <p:sp>
+        <p:nvSpPr>
+          <p:cNvPr id="29" name="Cube 28">
+            <a:extLst>
+              <a:ext uri="{FF2B5EF4-FFF2-40B4-BE49-F238E27FC236}">
+                <a16:creationId xmlns:a16="http://schemas.microsoft.com/office/drawing/2014/main" id="{C7C02A02-9986-49C3-A966-7FAB5671AE3E}"/>
               </a:ext>
             </a:extLst>
           </p:cNvPr>
@@ -11855,7 +11810,7 @@
         </p:nvSpPr>
         <p:spPr>
           <a:xfrm>
-            <a:off x="7342874" y="410944"/>
+            <a:off x="3077923" y="2610402"/>
             <a:ext cx="786395" cy="505103"/>
           </a:xfrm>
           <a:prstGeom prst="cube">
@@ -11890,12 +11845,95 @@
           </a:p>
         </p:txBody>
       </p:sp>
-      <p:sp>
-        <p:nvSpPr>
-          <p:cNvPr id="85" name="Cube 84">
-            <a:extLst>
-              <a:ext uri="{FF2B5EF4-FFF2-40B4-BE49-F238E27FC236}">
-                <a16:creationId xmlns:a16="http://schemas.microsoft.com/office/drawing/2014/main" id="{B3C3CCB5-0D50-4CC9-92C2-FBA77545C7F9}"/>
+      <p:cxnSp>
+        <p:nvCxnSpPr>
+          <p:cNvPr id="30" name="Gerader Verbinder 29">
+            <a:extLst>
+              <a:ext uri="{FF2B5EF4-FFF2-40B4-BE49-F238E27FC236}">
+                <a16:creationId xmlns:a16="http://schemas.microsoft.com/office/drawing/2014/main" id="{DF70D9A3-35F5-43C1-A755-223D01C1FB40}"/>
+              </a:ext>
+            </a:extLst>
+          </p:cNvPr>
+          <p:cNvCxnSpPr>
+            <a:cxnSpLocks/>
+            <a:stCxn id="29" idx="3"/>
+          </p:cNvCxnSpPr>
+          <p:nvPr/>
+        </p:nvCxnSpPr>
+        <p:spPr>
+          <a:xfrm>
+            <a:off x="3407983" y="3115505"/>
+            <a:ext cx="181448" cy="159602"/>
+          </a:xfrm>
+          <a:prstGeom prst="line">
+            <a:avLst/>
+          </a:prstGeom>
+        </p:spPr>
+        <p:style>
+          <a:lnRef idx="1">
+            <a:schemeClr val="accent2"/>
+          </a:lnRef>
+          <a:fillRef idx="0">
+            <a:schemeClr val="accent2"/>
+          </a:fillRef>
+          <a:effectRef idx="0">
+            <a:schemeClr val="accent2"/>
+          </a:effectRef>
+          <a:fontRef idx="minor">
+            <a:schemeClr val="tx1"/>
+          </a:fontRef>
+        </p:style>
+      </p:cxnSp>
+      <p:cxnSp>
+        <p:nvCxnSpPr>
+          <p:cNvPr id="31" name="Gerade Verbindung mit Pfeil 30">
+            <a:extLst>
+              <a:ext uri="{FF2B5EF4-FFF2-40B4-BE49-F238E27FC236}">
+                <a16:creationId xmlns:a16="http://schemas.microsoft.com/office/drawing/2014/main" id="{53870B25-8F00-4E10-9698-F31BF508C414}"/>
+              </a:ext>
+            </a:extLst>
+          </p:cNvPr>
+          <p:cNvCxnSpPr>
+            <a:cxnSpLocks/>
+            <a:stCxn id="26" idx="1"/>
+            <a:endCxn id="29" idx="3"/>
+          </p:cNvCxnSpPr>
+          <p:nvPr/>
+        </p:nvCxnSpPr>
+        <p:spPr>
+          <a:xfrm flipV="1">
+            <a:off x="2954675" y="3115505"/>
+            <a:ext cx="453308" cy="1987708"/>
+          </a:xfrm>
+          <a:prstGeom prst="straightConnector1">
+            <a:avLst/>
+          </a:prstGeom>
+          <a:ln w="28575">
+            <a:prstDash val="solid"/>
+            <a:tailEnd type="triangle"/>
+          </a:ln>
+        </p:spPr>
+        <p:style>
+          <a:lnRef idx="1">
+            <a:schemeClr val="accent2"/>
+          </a:lnRef>
+          <a:fillRef idx="0">
+            <a:schemeClr val="accent2"/>
+          </a:fillRef>
+          <a:effectRef idx="0">
+            <a:schemeClr val="accent2"/>
+          </a:effectRef>
+          <a:fontRef idx="minor">
+            <a:schemeClr val="tx1"/>
+          </a:fontRef>
+        </p:style>
+      </p:cxnSp>
+      <p:sp>
+        <p:nvSpPr>
+          <p:cNvPr id="14" name="Denkblase: wolkenförmig 13">
+            <a:extLst>
+              <a:ext uri="{FF2B5EF4-FFF2-40B4-BE49-F238E27FC236}">
+                <a16:creationId xmlns:a16="http://schemas.microsoft.com/office/drawing/2014/main" id="{2AB27021-4F08-4C37-AF99-7B69AA319B6E}"/>
               </a:ext>
             </a:extLst>
           </p:cNvPr>
@@ -11904,10 +11942,10 @@
         </p:nvSpPr>
         <p:spPr>
           <a:xfrm>
-            <a:off x="7747497" y="5342133"/>
-            <a:ext cx="786395" cy="505103"/>
-          </a:xfrm>
-          <a:prstGeom prst="cube">
+            <a:off x="2616499" y="4011483"/>
+            <a:ext cx="1244079" cy="686473"/>
+          </a:xfrm>
+          <a:prstGeom prst="cloudCallout">
             <a:avLst/>
           </a:prstGeom>
         </p:spPr>
@@ -11933,89 +11971,12 @@
           <a:p>
             <a:pPr algn="ctr"/>
             <a:r>
-              <a:rPr lang="de-DE" sz="1100"/>
-              <a:t>Mailbox</a:t>
-            </a:r>
-          </a:p>
-        </p:txBody>
-      </p:sp>
-      <p:cxnSp>
-        <p:nvCxnSpPr>
-          <p:cNvPr id="91" name="Gerader Verbinder 90">
-            <a:extLst>
-              <a:ext uri="{FF2B5EF4-FFF2-40B4-BE49-F238E27FC236}">
-                <a16:creationId xmlns:a16="http://schemas.microsoft.com/office/drawing/2014/main" id="{AE42AB20-4EA4-462B-A56E-AD35B3654720}"/>
-              </a:ext>
-            </a:extLst>
-          </p:cNvPr>
-          <p:cNvCxnSpPr>
-            <a:stCxn id="4" idx="7"/>
-          </p:cNvCxnSpPr>
-          <p:nvPr/>
-        </p:nvCxnSpPr>
-        <p:spPr>
-          <a:xfrm flipV="1">
-            <a:off x="7082621" y="902366"/>
-            <a:ext cx="232582" cy="152705"/>
-          </a:xfrm>
-          <a:prstGeom prst="line">
-            <a:avLst/>
-          </a:prstGeom>
-        </p:spPr>
-        <p:style>
-          <a:lnRef idx="1">
-            <a:schemeClr val="accent2"/>
-          </a:lnRef>
-          <a:fillRef idx="0">
-            <a:schemeClr val="accent2"/>
-          </a:fillRef>
-          <a:effectRef idx="0">
-            <a:schemeClr val="accent2"/>
-          </a:effectRef>
-          <a:fontRef idx="minor">
-            <a:schemeClr val="tx1"/>
-          </a:fontRef>
-        </p:style>
-      </p:cxnSp>
-      <p:cxnSp>
-        <p:nvCxnSpPr>
-          <p:cNvPr id="93" name="Gerader Verbinder 92">
-            <a:extLst>
-              <a:ext uri="{FF2B5EF4-FFF2-40B4-BE49-F238E27FC236}">
-                <a16:creationId xmlns:a16="http://schemas.microsoft.com/office/drawing/2014/main" id="{66186744-129F-4911-9471-E3EFD4DBC703}"/>
-              </a:ext>
-            </a:extLst>
-          </p:cNvPr>
-          <p:cNvCxnSpPr>
-            <a:stCxn id="70" idx="6"/>
-            <a:endCxn id="85" idx="2"/>
-          </p:cNvCxnSpPr>
-          <p:nvPr/>
-        </p:nvCxnSpPr>
-        <p:spPr>
-          <a:xfrm>
-            <a:off x="7387393" y="5594686"/>
-            <a:ext cx="360104" cy="63136"/>
-          </a:xfrm>
-          <a:prstGeom prst="line">
-            <a:avLst/>
-          </a:prstGeom>
-        </p:spPr>
-        <p:style>
-          <a:lnRef idx="1">
-            <a:schemeClr val="accent2"/>
-          </a:lnRef>
-          <a:fillRef idx="0">
-            <a:schemeClr val="accent2"/>
-          </a:fillRef>
-          <a:effectRef idx="0">
-            <a:schemeClr val="accent2"/>
-          </a:effectRef>
-          <a:fontRef idx="minor">
-            <a:schemeClr val="tx1"/>
-          </a:fontRef>
-        </p:style>
-      </p:cxnSp>
+              <a:rPr lang="de-DE" sz="800"/>
+              <a:t>Get Body of SootMethod1</a:t>
+            </a:r>
+          </a:p>
+        </p:txBody>
+      </p:sp>
     </p:spTree>
     <p:extLst>
       <p:ext uri="{BB962C8B-B14F-4D97-AF65-F5344CB8AC3E}">
@@ -12601,62 +12562,6 @@
       </p:sp>
       <p:sp>
         <p:nvSpPr>
-          <p:cNvPr id="26" name="Textfeld 25">
-            <a:extLst>
-              <a:ext uri="{FF2B5EF4-FFF2-40B4-BE49-F238E27FC236}">
-                <a16:creationId xmlns:a16="http://schemas.microsoft.com/office/drawing/2014/main" id="{FC1E27CA-F51D-4AAD-963C-65E52850EC15}"/>
-              </a:ext>
-            </a:extLst>
-          </p:cNvPr>
-          <p:cNvSpPr txBox="1"/>
-          <p:nvPr/>
-        </p:nvSpPr>
-        <p:spPr>
-          <a:xfrm>
-            <a:off x="7467600" y="2016369"/>
-            <a:ext cx="3470031" cy="1477328"/>
-          </a:xfrm>
-          <a:prstGeom prst="rect">
-            <a:avLst/>
-          </a:prstGeom>
-          <a:noFill/>
-        </p:spPr>
-        <p:txBody>
-          <a:bodyPr wrap="square" rtlCol="0">
-            <a:spAutoFit/>
-          </a:bodyPr>
-          <a:lstStyle/>
-          <a:p>
-            <a:r>
-              <a:rPr lang="de-DE"/>
-              <a:t>1: addStmt(s1)</a:t>
-            </a:r>
-          </a:p>
-          <a:p>
-            <a:r>
-              <a:rPr lang="de-DE"/>
-              <a:t>2: deleteStmt(s3)</a:t>
-            </a:r>
-          </a:p>
-          <a:p>
-            <a:r>
-              <a:rPr lang="de-DE"/>
-              <a:t>3: { addStmt(s2), addStmt(s4)}</a:t>
-            </a:r>
-          </a:p>
-          <a:p>
-            <a:r>
-              <a:rPr lang="de-DE"/>
-              <a:t>…</a:t>
-            </a:r>
-          </a:p>
-          <a:p>
-            <a:endParaRPr lang="de-DE"/>
-          </a:p>
-        </p:txBody>
-      </p:sp>
-      <p:sp>
-        <p:nvSpPr>
           <p:cNvPr id="27" name="Ellipse 26">
             <a:extLst>
               <a:ext uri="{FF2B5EF4-FFF2-40B4-BE49-F238E27FC236}">
@@ -13121,6 +13026,56 @@
               <a:rPr lang="de-DE"/>
               <a:t>5</a:t>
             </a:r>
+          </a:p>
+        </p:txBody>
+      </p:sp>
+      <p:sp>
+        <p:nvSpPr>
+          <p:cNvPr id="25" name="Textfeld 24">
+            <a:extLst>
+              <a:ext uri="{FF2B5EF4-FFF2-40B4-BE49-F238E27FC236}">
+                <a16:creationId xmlns:a16="http://schemas.microsoft.com/office/drawing/2014/main" id="{0D78D1C4-B381-4763-9A89-4C9085E22013}"/>
+              </a:ext>
+            </a:extLst>
+          </p:cNvPr>
+          <p:cNvSpPr txBox="1"/>
+          <p:nvPr/>
+        </p:nvSpPr>
+        <p:spPr>
+          <a:xfrm>
+            <a:off x="7467600" y="2016369"/>
+            <a:ext cx="3470031" cy="1200329"/>
+          </a:xfrm>
+          <a:prstGeom prst="rect">
+            <a:avLst/>
+          </a:prstGeom>
+          <a:noFill/>
+        </p:spPr>
+        <p:txBody>
+          <a:bodyPr wrap="square" rtlCol="0">
+            <a:spAutoFit/>
+          </a:bodyPr>
+          <a:lstStyle/>
+          <a:p>
+            <a:r>
+              <a:rPr lang="de-DE"/>
+              <a:t>1: updateBody(b1)</a:t>
+            </a:r>
+          </a:p>
+          <a:p>
+            <a:r>
+              <a:rPr lang="de-DE"/>
+              <a:t>2: updateBody(b2)</a:t>
+            </a:r>
+          </a:p>
+          <a:p>
+            <a:r>
+              <a:rPr lang="de-DE"/>
+              <a:t>…</a:t>
+            </a:r>
+          </a:p>
+          <a:p>
+            <a:endParaRPr lang="de-DE"/>
           </a:p>
         </p:txBody>
       </p:sp>
@@ -13722,7 +13677,7 @@
         <p:spPr>
           <a:xfrm>
             <a:off x="7467600" y="2016369"/>
-            <a:ext cx="3470031" cy="1477328"/>
+            <a:ext cx="3470031" cy="1200329"/>
           </a:xfrm>
           <a:prstGeom prst="rect">
             <a:avLst/>
@@ -13737,19 +13692,13 @@
           <a:p>
             <a:r>
               <a:rPr lang="de-DE"/>
-              <a:t>1: addStmt(s1)</a:t>
+              <a:t>1: updateBody(b1)</a:t>
             </a:r>
           </a:p>
           <a:p>
             <a:r>
               <a:rPr lang="de-DE"/>
-              <a:t>2: deleteStmt(s3)</a:t>
-            </a:r>
-          </a:p>
-          <a:p>
-            <a:r>
-              <a:rPr lang="de-DE"/>
-              <a:t>3: { addStmt(s2), addStmt(s4)}</a:t>
+              <a:t>2: updateBody(b2)</a:t>
             </a:r>
           </a:p>
           <a:p>

</xml_diff>